<commit_message>
1. ver1.7     - UI Clear / debug ~ ing     - ppt clear
</commit_message>
<xml_diff>
--- a/APP_Call-Visit-System_Solo.pptx
+++ b/APP_Call-Visit-System_Solo.pptx
@@ -38,32 +38,32 @@
       <p:boldItalic r:id="rId23"/>
     </p:embeddedFont>
     <p:embeddedFont>
-      <p:font typeface="휴먼엑스포" pitchFamily="18" charset="-127"/>
+      <p:font typeface="함초롬바탕" pitchFamily="18" charset="-127"/>
       <p:regular r:id="rId24"/>
+      <p:bold r:id="rId25"/>
+    </p:embeddedFont>
+    <p:embeddedFont>
+      <p:font typeface="HY헤드라인M" pitchFamily="18" charset="-127"/>
+      <p:regular r:id="rId26"/>
     </p:embeddedFont>
     <p:embeddedFont>
       <p:font typeface="Calibri Light" pitchFamily="34" charset="0"/>
-      <p:regular r:id="rId25"/>
-      <p:italic r:id="rId26"/>
-    </p:embeddedFont>
-    <p:embeddedFont>
-      <p:font typeface="함초롬바탕" pitchFamily="18" charset="-127"/>
       <p:regular r:id="rId27"/>
-      <p:bold r:id="rId28"/>
-    </p:embeddedFont>
-    <p:embeddedFont>
-      <p:font typeface="HY헤드라인M" pitchFamily="18" charset="-127"/>
-      <p:regular r:id="rId29"/>
+      <p:italic r:id="rId28"/>
     </p:embeddedFont>
     <p:embeddedFont>
       <p:font typeface="나눔바른고딕" charset="-127"/>
-      <p:regular r:id="rId30"/>
-      <p:bold r:id="rId31"/>
+      <p:regular r:id="rId29"/>
+      <p:bold r:id="rId30"/>
     </p:embeddedFont>
     <p:embeddedFont>
       <p:font typeface="맑은 고딕" pitchFamily="50" charset="-127"/>
-      <p:regular r:id="rId32"/>
-      <p:bold r:id="rId33"/>
+      <p:regular r:id="rId31"/>
+      <p:bold r:id="rId32"/>
+    </p:embeddedFont>
+    <p:embeddedFont>
+      <p:font typeface="휴먼엑스포" pitchFamily="18" charset="-127"/>
+      <p:regular r:id="rId33"/>
     </p:embeddedFont>
     <p:embeddedFont>
       <p:font typeface="Verdana" pitchFamily="34" charset="0"/>
@@ -170,7 +170,7 @@
   </p:defaultTextStyle>
   <p:extLst>
     <p:ext uri="{EFAFB233-063F-42B5-8137-9DF3F51BA10A}">
-      <p15:sldGuideLst xmlns:p15="http://schemas.microsoft.com/office/powerpoint/2012/main" xmlns="">
+      <p15:sldGuideLst xmlns="" xmlns:p15="http://schemas.microsoft.com/office/powerpoint/2012/main">
         <p15:guide id="1" orient="horz" pos="2160" userDrawn="1">
           <p15:clr>
             <a:srgbClr val="A4A3A4"/>
@@ -319,7 +319,7 @@
             <a:fld id="{48B36C2D-6736-4D22-98A2-961E2A1989A1}" type="datetimeFigureOut">
               <a:rPr lang="ko-KR" altLang="en-US" smtClean="0"/>
               <a:pPr/>
-              <a:t>2019-10-24</a:t>
+              <a:t>2019-10-25</a:t>
             </a:fld>
             <a:endParaRPr lang="ko-KR" altLang="en-US"/>
           </a:p>
@@ -498,7 +498,7 @@
             <a:fld id="{48B36C2D-6736-4D22-98A2-961E2A1989A1}" type="datetimeFigureOut">
               <a:rPr lang="ko-KR" altLang="en-US" smtClean="0"/>
               <a:pPr/>
-              <a:t>2019-10-24</a:t>
+              <a:t>2019-10-25</a:t>
             </a:fld>
             <a:endParaRPr lang="ko-KR" altLang="en-US"/>
           </a:p>
@@ -680,7 +680,7 @@
             <a:fld id="{48B36C2D-6736-4D22-98A2-961E2A1989A1}" type="datetimeFigureOut">
               <a:rPr lang="ko-KR" altLang="en-US" smtClean="0"/>
               <a:pPr/>
-              <a:t>2019-10-24</a:t>
+              <a:t>2019-10-25</a:t>
             </a:fld>
             <a:endParaRPr lang="ko-KR" altLang="en-US"/>
           </a:p>
@@ -852,7 +852,7 @@
             <a:fld id="{48B36C2D-6736-4D22-98A2-961E2A1989A1}" type="datetimeFigureOut">
               <a:rPr lang="ko-KR" altLang="en-US" smtClean="0"/>
               <a:pPr/>
-              <a:t>2019-10-24</a:t>
+              <a:t>2019-10-25</a:t>
             </a:fld>
             <a:endParaRPr lang="ko-KR" altLang="en-US"/>
           </a:p>
@@ -1105,7 +1105,7 @@
             <a:fld id="{48B36C2D-6736-4D22-98A2-961E2A1989A1}" type="datetimeFigureOut">
               <a:rPr lang="ko-KR" altLang="en-US" smtClean="0"/>
               <a:pPr/>
-              <a:t>2019-10-24</a:t>
+              <a:t>2019-10-25</a:t>
             </a:fld>
             <a:endParaRPr lang="ko-KR" altLang="en-US"/>
           </a:p>
@@ -1339,7 +1339,7 @@
             <a:fld id="{48B36C2D-6736-4D22-98A2-961E2A1989A1}" type="datetimeFigureOut">
               <a:rPr lang="ko-KR" altLang="en-US" smtClean="0"/>
               <a:pPr/>
-              <a:t>2019-10-24</a:t>
+              <a:t>2019-10-25</a:t>
             </a:fld>
             <a:endParaRPr lang="ko-KR" altLang="en-US"/>
           </a:p>
@@ -1708,7 +1708,7 @@
             <a:fld id="{48B36C2D-6736-4D22-98A2-961E2A1989A1}" type="datetimeFigureOut">
               <a:rPr lang="ko-KR" altLang="en-US" smtClean="0"/>
               <a:pPr/>
-              <a:t>2019-10-24</a:t>
+              <a:t>2019-10-25</a:t>
             </a:fld>
             <a:endParaRPr lang="ko-KR" altLang="en-US"/>
           </a:p>
@@ -1828,7 +1828,7 @@
             <a:fld id="{48B36C2D-6736-4D22-98A2-961E2A1989A1}" type="datetimeFigureOut">
               <a:rPr lang="ko-KR" altLang="en-US" smtClean="0"/>
               <a:pPr/>
-              <a:t>2019-10-24</a:t>
+              <a:t>2019-10-25</a:t>
             </a:fld>
             <a:endParaRPr lang="ko-KR" altLang="en-US"/>
           </a:p>
@@ -1925,7 +1925,7 @@
             <a:fld id="{48B36C2D-6736-4D22-98A2-961E2A1989A1}" type="datetimeFigureOut">
               <a:rPr lang="ko-KR" altLang="en-US" smtClean="0"/>
               <a:pPr/>
-              <a:t>2019-10-24</a:t>
+              <a:t>2019-10-25</a:t>
             </a:fld>
             <a:endParaRPr lang="ko-KR" altLang="en-US"/>
           </a:p>
@@ -2204,7 +2204,7 @@
             <a:fld id="{48B36C2D-6736-4D22-98A2-961E2A1989A1}" type="datetimeFigureOut">
               <a:rPr lang="ko-KR" altLang="en-US" smtClean="0"/>
               <a:pPr/>
-              <a:t>2019-10-24</a:t>
+              <a:t>2019-10-25</a:t>
             </a:fld>
             <a:endParaRPr lang="ko-KR" altLang="en-US"/>
           </a:p>
@@ -2463,7 +2463,7 @@
             <a:fld id="{48B36C2D-6736-4D22-98A2-961E2A1989A1}" type="datetimeFigureOut">
               <a:rPr lang="ko-KR" altLang="en-US" smtClean="0"/>
               <a:pPr/>
-              <a:t>2019-10-24</a:t>
+              <a:t>2019-10-25</a:t>
             </a:fld>
             <a:endParaRPr lang="ko-KR" altLang="en-US"/>
           </a:p>
@@ -2693,7 +2693,7 @@
             <a:fld id="{48B36C2D-6736-4D22-98A2-961E2A1989A1}" type="datetimeFigureOut">
               <a:rPr lang="ko-KR" altLang="en-US" smtClean="0"/>
               <a:pPr/>
-              <a:t>2019-10-24</a:t>
+              <a:t>2019-10-25</a:t>
             </a:fld>
             <a:endParaRPr lang="ko-KR" altLang="en-US"/>
           </a:p>
@@ -8872,7 +8872,7 @@
       </p:pic>
       <p:pic>
         <p:nvPicPr>
-          <p:cNvPr id="8194" name="Picture 2"/>
+          <p:cNvPr id="2050" name="Picture 2"/>
           <p:cNvPicPr>
             <a:picLocks noChangeAspect="1" noChangeArrowheads="1"/>
           </p:cNvPicPr>
@@ -8893,8 +8893,8 @@
         </p:blipFill>
         <p:spPr bwMode="auto">
           <a:xfrm>
-            <a:off x="695484" y="1651000"/>
-            <a:ext cx="1956468" cy="3567371"/>
+            <a:off x="743249" y="1422400"/>
+            <a:ext cx="1860251" cy="3729363"/>
           </a:xfrm>
           <a:prstGeom prst="rect">
             <a:avLst/>
@@ -8942,7 +8942,7 @@
         </p:nvSpPr>
         <p:spPr>
           <a:xfrm>
-            <a:off x="657384" y="2235010"/>
+            <a:off x="657384" y="2069910"/>
             <a:ext cx="2057963" cy="315220"/>
           </a:xfrm>
           <a:prstGeom prst="rect">
@@ -9504,14 +9504,7 @@
                 <a:latin typeface="나눔고딕" pitchFamily="50" charset="-127"/>
                 <a:ea typeface="나눔고딕" pitchFamily="50" charset="-127"/>
               </a:rPr>
-              <a:t> </a:t>
-            </a:r>
-            <a:r>
-              <a:rPr lang="ko-KR" altLang="en-US" sz="1600" dirty="0" smtClean="0">
-                <a:latin typeface="나눔고딕" pitchFamily="50" charset="-127"/>
-                <a:ea typeface="나눔고딕" pitchFamily="50" charset="-127"/>
-              </a:rPr>
-              <a:t>일부 </a:t>
+              <a:t> 일부 </a:t>
             </a:r>
             <a:r>
               <a:rPr lang="ko-KR" altLang="en-US" sz="1600" b="1" dirty="0" smtClean="0">
@@ -10648,14 +10641,7 @@
                 <a:latin typeface="나눔고딕" panose="020B0600000101010101" charset="-127"/>
                 <a:ea typeface="나눔고딕" panose="020B0600000101010101" charset="-127"/>
               </a:rPr>
-              <a:t>01 </a:t>
-            </a:r>
-            <a:r>
-              <a:rPr lang="en-US" altLang="ko-KR" b="1" dirty="0" smtClean="0">
-                <a:latin typeface="나눔고딕" panose="020B0600000101010101" charset="-127"/>
-                <a:ea typeface="나눔고딕" panose="020B0600000101010101" charset="-127"/>
-              </a:rPr>
-              <a:t>&gt;&gt;  </a:t>
+              <a:t>01 &gt;&gt;  </a:t>
             </a:r>
             <a:r>
               <a:rPr lang="ko-KR" altLang="en-US" b="1" dirty="0" smtClean="0">
@@ -10701,27 +10687,27 @@
                 <a:latin typeface="고딕"/>
                 <a:ea typeface="HY헤드라인M" pitchFamily="18" charset="-127"/>
               </a:rPr>
-              <a:t>병력들 출타 간 용사와 간부 사이 간 </a:t>
+              <a:t>용사와 </a:t>
             </a:r>
             <a:r>
               <a:rPr lang="ko-KR" altLang="en-US" sz="2000" b="1" dirty="0" smtClean="0">
                 <a:solidFill>
-                  <a:srgbClr val="0000CC"/>
+                  <a:srgbClr val="939BA5"/>
                 </a:solidFill>
                 <a:latin typeface="고딕"/>
                 <a:ea typeface="HY헤드라인M" pitchFamily="18" charset="-127"/>
               </a:rPr>
-              <a:t>소통</a:t>
+              <a:t>간부 사이 간 </a:t>
             </a:r>
             <a:r>
               <a:rPr lang="ko-KR" altLang="en-US" sz="2000" b="1" dirty="0" smtClean="0">
                 <a:solidFill>
-                  <a:srgbClr val="939BA5"/>
+                  <a:srgbClr val="0000CC"/>
                 </a:solidFill>
                 <a:latin typeface="고딕"/>
                 <a:ea typeface="HY헤드라인M" pitchFamily="18" charset="-127"/>
               </a:rPr>
-              <a:t>을 강화해주는 </a:t>
+              <a:t>소통</a:t>
             </a:r>
             <a:r>
               <a:rPr lang="ko-KR" altLang="en-US" sz="2000" b="1" dirty="0" smtClean="0">
@@ -10731,7 +10717,7 @@
                 <a:latin typeface="고딕"/>
                 <a:ea typeface="HY헤드라인M" pitchFamily="18" charset="-127"/>
               </a:rPr>
-              <a:t>어플리케이션</a:t>
+              <a:t>을 강화해주는 어플리케이션</a:t>
             </a:r>
             <a:endParaRPr lang="en-US" altLang="ko-KR" sz="2000" b="1" dirty="0" smtClean="0">
               <a:solidFill>
@@ -11851,14 +11837,7 @@
                 <a:latin typeface="나눔고딕" panose="020B0600000101010101" charset="-127"/>
                 <a:ea typeface="나눔고딕" panose="020B0600000101010101" charset="-127"/>
               </a:rPr>
-              <a:t>02 </a:t>
-            </a:r>
-            <a:r>
-              <a:rPr lang="en-US" altLang="ko-KR" b="1" dirty="0" smtClean="0">
-                <a:latin typeface="나눔고딕" panose="020B0600000101010101" charset="-127"/>
-                <a:ea typeface="나눔고딕" panose="020B0600000101010101" charset="-127"/>
-              </a:rPr>
-              <a:t>&gt;&gt;  </a:t>
+              <a:t>02 &gt;&gt;  </a:t>
             </a:r>
             <a:r>
               <a:rPr lang="ko-KR" altLang="en-US" b="1" dirty="0" smtClean="0">
@@ -13889,11 +13868,11 @@
   <p:clrMapOvr>
     <a:masterClrMapping/>
   </p:clrMapOvr>
-  <mc:AlternateContent xmlns:mc="http://schemas.openxmlformats.org/markup-compatibility/2006">
-    <mc:Choice xmlns:p14="http://schemas.microsoft.com/office/powerpoint/2010/main" Requires="p14">
+  <mc:AlternateContent xmlns:mc="http://schemas.openxmlformats.org/markup-compatibility/2006" xmlns:p14="http://schemas.microsoft.com/office/powerpoint/2010/main">
+    <mc:Choice Requires="p14">
       <p:transition p14:dur="0"/>
     </mc:Choice>
-    <mc:Fallback>
+    <mc:Fallback xmlns="">
       <p:transition/>
     </mc:Fallback>
   </mc:AlternateContent>
@@ -14449,14 +14428,7 @@
                 <a:latin typeface="나눔고딕" panose="020B0600000101010101" charset="-127"/>
                 <a:ea typeface="나눔고딕" panose="020B0600000101010101" charset="-127"/>
               </a:rPr>
-              <a:t>03 </a:t>
-            </a:r>
-            <a:r>
-              <a:rPr lang="en-US" altLang="ko-KR" b="1" dirty="0" smtClean="0">
-                <a:latin typeface="나눔고딕" panose="020B0600000101010101" charset="-127"/>
-                <a:ea typeface="나눔고딕" panose="020B0600000101010101" charset="-127"/>
-              </a:rPr>
-              <a:t>&gt;&gt;  </a:t>
+              <a:t>03 &gt;&gt;  </a:t>
             </a:r>
             <a:r>
               <a:rPr lang="ko-KR" altLang="en-US" b="1" dirty="0" smtClean="0">
@@ -18258,15 +18230,6 @@
               </a:rPr>
               <a:t>1.8.0_221</a:t>
             </a:r>
-            <a:endParaRPr lang="en-US" altLang="ko-KR" sz="2000" dirty="0" smtClean="0">
-              <a:solidFill>
-                <a:schemeClr val="accent6">
-                  <a:lumMod val="50000"/>
-                </a:schemeClr>
-              </a:solidFill>
-              <a:latin typeface="나눔고딕" panose="020D0604000000000000" pitchFamily="50" charset="-127"/>
-              <a:ea typeface="나눔고딕" panose="020D0604000000000000" pitchFamily="50" charset="-127"/>
-            </a:endParaRPr>
           </a:p>
           <a:p>
             <a:pPr lvl="1"/>
@@ -18280,31 +18243,7 @@
                 <a:latin typeface="나눔고딕" panose="020D0604000000000000" pitchFamily="50" charset="-127"/>
                 <a:ea typeface="나눔고딕" panose="020D0604000000000000" pitchFamily="50" charset="-127"/>
               </a:rPr>
-              <a:t>Android </a:t>
-            </a:r>
-            <a:r>
-              <a:rPr lang="en-US" altLang="ko-KR" sz="2000" dirty="0" smtClean="0">
-                <a:solidFill>
-                  <a:schemeClr val="accent6">
-                    <a:lumMod val="50000"/>
-                  </a:schemeClr>
-                </a:solidFill>
-                <a:latin typeface="나눔고딕" panose="020D0604000000000000" pitchFamily="50" charset="-127"/>
-                <a:ea typeface="나눔고딕" panose="020D0604000000000000" pitchFamily="50" charset="-127"/>
-              </a:rPr>
-              <a:t>9</a:t>
-            </a:r>
-            <a:r>
-              <a:rPr lang="en-US" altLang="ko-KR" sz="2000" dirty="0" smtClean="0">
-                <a:solidFill>
-                  <a:schemeClr val="accent6">
-                    <a:lumMod val="50000"/>
-                  </a:schemeClr>
-                </a:solidFill>
-                <a:latin typeface="나눔고딕" panose="020D0604000000000000" pitchFamily="50" charset="-127"/>
-                <a:ea typeface="나눔고딕" panose="020D0604000000000000" pitchFamily="50" charset="-127"/>
-              </a:rPr>
-              <a:t>.0(API 28)</a:t>
+              <a:t>Android 9.0(API 28)</a:t>
             </a:r>
             <a:endParaRPr lang="en-US" altLang="ko-KR" sz="2000" dirty="0">
               <a:solidFill>
@@ -20776,20 +20715,7 @@
                 <a:ea typeface="맑은 고딕" pitchFamily="50" charset="-127"/>
                 <a:cs typeface="Times New Roman" pitchFamily="18" charset="0"/>
               </a:rPr>
-              <a:t>서비스 로고 </a:t>
-            </a:r>
-            <a:r>
-              <a:rPr kumimoji="1" lang="ko-KR" altLang="en-US" sz="1600" dirty="0" smtClean="0">
-                <a:solidFill>
-                  <a:schemeClr val="accent1">
-                    <a:lumMod val="75000"/>
-                  </a:schemeClr>
-                </a:solidFill>
-                <a:latin typeface="맑은 고딕" pitchFamily="50" charset="-127"/>
-                <a:ea typeface="맑은 고딕" pitchFamily="50" charset="-127"/>
-                <a:cs typeface="Times New Roman" pitchFamily="18" charset="0"/>
-              </a:rPr>
-              <a:t>이미지</a:t>
+              <a:t>서비스 로고 이미지</a:t>
             </a:r>
             <a:endParaRPr kumimoji="1" lang="en-US" altLang="ko-KR" sz="1600" dirty="0" smtClean="0">
               <a:solidFill>
@@ -22426,70 +22352,6 @@
       </p:pic>
       <p:pic>
         <p:nvPicPr>
-          <p:cNvPr id="20" name="Picture 5"/>
-          <p:cNvPicPr>
-            <a:picLocks noChangeAspect="1" noChangeArrowheads="1"/>
-          </p:cNvPicPr>
-          <p:nvPr/>
-        </p:nvPicPr>
-        <p:blipFill>
-          <a:blip r:embed="rId3" cstate="print">
-            <a:extLst>
-              <a:ext uri="{28A0092B-C50C-407E-A947-70E740481C1C}">
-                <a14:useLocalDpi xmlns:a14="http://schemas.microsoft.com/office/drawing/2010/main" val="0"/>
-              </a:ext>
-            </a:extLst>
-          </a:blip>
-          <a:srcRect/>
-          <a:stretch>
-            <a:fillRect/>
-          </a:stretch>
-        </p:blipFill>
-        <p:spPr bwMode="auto">
-          <a:xfrm>
-            <a:off x="322035" y="3403600"/>
-            <a:ext cx="1189210" cy="2171700"/>
-          </a:xfrm>
-          <a:prstGeom prst="rect">
-            <a:avLst/>
-          </a:prstGeom>
-          <a:noFill/>
-          <a:ln>
-            <a:noFill/>
-          </a:ln>
-          <a:effectLst/>
-          <a:extLst>
-            <a:ext uri="{909E8E84-426E-40DD-AFC4-6F175D3DCCD1}">
-              <a14:hiddenFill xmlns:a14="http://schemas.microsoft.com/office/drawing/2010/main">
-                <a:solidFill>
-                  <a:schemeClr val="accent1"/>
-                </a:solidFill>
-              </a14:hiddenFill>
-            </a:ext>
-            <a:ext uri="{91240B29-F687-4F45-9708-019B960494DF}">
-              <a14:hiddenLine xmlns:a14="http://schemas.microsoft.com/office/drawing/2010/main" w="9525">
-                <a:solidFill>
-                  <a:schemeClr val="tx1"/>
-                </a:solidFill>
-                <a:miter lim="800000"/>
-                <a:headEnd/>
-                <a:tailEnd/>
-              </a14:hiddenLine>
-            </a:ext>
-            <a:ext uri="{AF507438-7753-43E0-B8FC-AC1667EBCBE1}">
-              <a14:hiddenEffects xmlns:a14="http://schemas.microsoft.com/office/drawing/2010/main">
-                <a:effectLst>
-                  <a:outerShdw dist="35921" dir="2700000" algn="ctr" rotWithShape="0">
-                    <a:schemeClr val="bg2"/>
-                  </a:outerShdw>
-                </a:effectLst>
-              </a14:hiddenEffects>
-            </a:ext>
-          </a:extLst>
-        </p:spPr>
-      </p:pic>
-      <p:pic>
-        <p:nvPicPr>
           <p:cNvPr id="21" name="Picture 2" descr="C:\Users\Admin\Downloads\phone.png"/>
           <p:cNvPicPr>
             <a:picLocks noChangeAspect="1" noChangeArrowheads="1"/>
@@ -22538,7 +22400,7 @@
           <p:nvPr/>
         </p:nvPicPr>
         <p:blipFill>
-          <a:blip r:embed="rId4" cstate="print">
+          <a:blip r:embed="rId3" cstate="print">
             <a:extLst>
               <a:ext uri="{28A0092B-C50C-407E-A947-70E740481C1C}">
                 <a14:useLocalDpi xmlns:a14="http://schemas.microsoft.com/office/drawing/2010/main" val="0"/>
@@ -22554,6 +22416,70 @@
           <a:xfrm>
             <a:off x="1929011" y="1155700"/>
             <a:ext cx="1169789" cy="2413125"/>
+          </a:xfrm>
+          <a:prstGeom prst="rect">
+            <a:avLst/>
+          </a:prstGeom>
+          <a:noFill/>
+          <a:ln>
+            <a:noFill/>
+          </a:ln>
+          <a:effectLst/>
+          <a:extLst>
+            <a:ext uri="{909E8E84-426E-40DD-AFC4-6F175D3DCCD1}">
+              <a14:hiddenFill xmlns:a14="http://schemas.microsoft.com/office/drawing/2010/main">
+                <a:solidFill>
+                  <a:schemeClr val="accent1"/>
+                </a:solidFill>
+              </a14:hiddenFill>
+            </a:ext>
+            <a:ext uri="{91240B29-F687-4F45-9708-019B960494DF}">
+              <a14:hiddenLine xmlns:a14="http://schemas.microsoft.com/office/drawing/2010/main" w="9525">
+                <a:solidFill>
+                  <a:schemeClr val="tx1"/>
+                </a:solidFill>
+                <a:miter lim="800000"/>
+                <a:headEnd/>
+                <a:tailEnd/>
+              </a14:hiddenLine>
+            </a:ext>
+            <a:ext uri="{AF507438-7753-43E0-B8FC-AC1667EBCBE1}">
+              <a14:hiddenEffects xmlns:a14="http://schemas.microsoft.com/office/drawing/2010/main">
+                <a:effectLst>
+                  <a:outerShdw dist="35921" dir="2700000" algn="ctr" rotWithShape="0">
+                    <a:schemeClr val="bg2"/>
+                  </a:outerShdw>
+                </a:effectLst>
+              </a14:hiddenEffects>
+            </a:ext>
+          </a:extLst>
+        </p:spPr>
+      </p:pic>
+      <p:pic>
+        <p:nvPicPr>
+          <p:cNvPr id="1026" name="Picture 2"/>
+          <p:cNvPicPr>
+            <a:picLocks noChangeAspect="1" noChangeArrowheads="1"/>
+          </p:cNvPicPr>
+          <p:nvPr/>
+        </p:nvPicPr>
+        <p:blipFill>
+          <a:blip r:embed="rId4" cstate="print">
+            <a:extLst>
+              <a:ext uri="{28A0092B-C50C-407E-A947-70E740481C1C}">
+                <a14:useLocalDpi xmlns:a14="http://schemas.microsoft.com/office/drawing/2010/main" val="0"/>
+              </a:ext>
+            </a:extLst>
+          </a:blip>
+          <a:srcRect/>
+          <a:stretch>
+            <a:fillRect/>
+          </a:stretch>
+        </p:blipFill>
+        <p:spPr bwMode="auto">
+          <a:xfrm>
+            <a:off x="290000" y="3467100"/>
+            <a:ext cx="1259399" cy="2210126"/>
           </a:xfrm>
           <a:prstGeom prst="rect">
             <a:avLst/>
@@ -22838,7 +22764,7 @@
   <a:extraClrSchemeLst/>
   <a:extLst>
     <a:ext uri="{05A4C25C-085E-4340-85A3-A5531E510DB2}">
-      <thm15:themeFamily xmlns:thm15="http://schemas.microsoft.com/office/thememl/2012/main" xmlns="" name="Office Theme" id="{62F939B6-93AF-4DB8-9C6B-D6C7DFDC589F}" vid="{4A3C46E8-61CC-4603-A589-7422A47A8E4A}"/>
+      <thm15:themeFamily xmlns="" xmlns:thm15="http://schemas.microsoft.com/office/thememl/2012/main" name="Office Theme" id="{62F939B6-93AF-4DB8-9C6B-D6C7DFDC589F}" vid="{4A3C46E8-61CC-4603-A589-7422A47A8E4A}"/>
     </a:ext>
   </a:extLst>
 </a:theme>

</xml_diff>